<commit_message>
make arrows 45° so that my aesthetic sensitivity is satisfied
</commit_message>
<xml_diff>
--- a/man/figures/workflow.pptx
+++ b/man/figures/workflow.pptx
@@ -5573,8 +5573,8 @@
         </p:nvSpPr>
         <p:spPr>
           <a:xfrm>
-            <a:off x="3162287" y="2875455"/>
-            <a:ext cx="1607820" cy="693420"/>
+            <a:off x="2915455" y="2768817"/>
+            <a:ext cx="2101670" cy="693420"/>
           </a:xfrm>
           <a:prstGeom prst="rect">
             <a:avLst/>
@@ -5604,7 +5604,7 @@
           <a:p>
             <a:pPr algn="ctr"/>
             <a:r>
-              <a:rPr lang="fr-FR" sz="2400" b="1" dirty="0">
+              <a:rPr lang="fr-FR" sz="3200" b="1" dirty="0">
                 <a:solidFill>
                   <a:srgbClr val="F6591A"/>
                 </a:solidFill>
@@ -5612,7 +5612,7 @@
               </a:rPr>
               <a:t>report()</a:t>
             </a:r>
-            <a:endParaRPr lang="en-GB" sz="2400" b="1" dirty="0">
+            <a:endParaRPr lang="en-GB" sz="3200" b="1" dirty="0">
               <a:solidFill>
                 <a:srgbClr val="F6591A"/>
               </a:solidFill>
@@ -5710,7 +5710,9 @@
             <a:r>
               <a:rPr lang="fr-FR" sz="2000" b="1" i="1" dirty="0">
                 <a:solidFill>
-                  <a:srgbClr val="F6591A"/>
+                  <a:schemeClr val="bg1">
+                    <a:lumMod val="50000"/>
+                  </a:schemeClr>
                 </a:solidFill>
               </a:rPr>
               <a:t>Direct </a:t>
@@ -5718,7 +5720,9 @@
             <a:r>
               <a:rPr lang="fr-FR" sz="2000" b="1" i="1" dirty="0" err="1">
                 <a:solidFill>
-                  <a:srgbClr val="F6591A"/>
+                  <a:schemeClr val="bg1">
+                    <a:lumMod val="50000"/>
+                  </a:schemeClr>
                 </a:solidFill>
               </a:rPr>
               <a:t>access</a:t>
@@ -5726,7 +5730,9 @@
             <a:r>
               <a:rPr lang="fr-FR" sz="2000" b="1" i="1" dirty="0">
                 <a:solidFill>
-                  <a:srgbClr val="F6591A"/>
+                  <a:schemeClr val="bg1">
+                    <a:lumMod val="50000"/>
+                  </a:schemeClr>
                 </a:solidFill>
               </a:rPr>
               <a:t> to </a:t>
@@ -5734,7 +5740,9 @@
             <a:r>
               <a:rPr lang="fr-FR" sz="2000" b="1" i="1" dirty="0" err="1">
                 <a:solidFill>
-                  <a:srgbClr val="F6591A"/>
+                  <a:schemeClr val="bg1">
+                    <a:lumMod val="50000"/>
+                  </a:schemeClr>
                 </a:solidFill>
               </a:rPr>
               <a:t>subparts</a:t>
@@ -5742,7 +5750,9 @@
             <a:r>
               <a:rPr lang="fr-FR" sz="2000" b="1" i="1" dirty="0">
                 <a:solidFill>
-                  <a:srgbClr val="F6591A"/>
+                  <a:schemeClr val="bg1">
+                    <a:lumMod val="50000"/>
+                  </a:schemeClr>
                 </a:solidFill>
               </a:rPr>
               <a:t>:</a:t>
@@ -6061,7 +6071,7 @@
                 </a:solidFill>
                 <a:latin typeface="Brush Script MT" panose="03060802040406070304" pitchFamily="66" charset="0"/>
               </a:rPr>
-              <a:t> to create life... He had such a knowledge of the report package that he could even keep the ones he cared about from dying. The dark side of the </a:t>
+              <a:t> to create life... He had such a knowledge of the report package that he could even keep the ones he cared about from dying. The dark side of </a:t>
             </a:r>
             <a:r>
               <a:rPr lang="en-GB" sz="1200" b="1" dirty="0" err="1">
@@ -6935,8 +6945,8 @@
         </p:nvCxnSpPr>
         <p:spPr>
           <a:xfrm flipV="1">
-            <a:off x="6717982" y="1094568"/>
-            <a:ext cx="2566708" cy="2334433"/>
+            <a:off x="6717982" y="1066708"/>
+            <a:ext cx="2566138" cy="2362293"/>
           </a:xfrm>
           <a:prstGeom prst="straightConnector1">
             <a:avLst/>
@@ -6971,13 +6981,14 @@
           </p:cNvPr>
           <p:cNvCxnSpPr>
             <a:cxnSpLocks/>
+            <a:endCxn id="10" idx="1"/>
           </p:cNvCxnSpPr>
           <p:nvPr/>
         </p:nvCxnSpPr>
         <p:spPr>
           <a:xfrm>
-            <a:off x="8286750" y="1962150"/>
-            <a:ext cx="870599" cy="791188"/>
+            <a:off x="8407082" y="1904652"/>
+            <a:ext cx="874589" cy="864165"/>
           </a:xfrm>
           <a:prstGeom prst="straightConnector1">
             <a:avLst/>
@@ -7059,8 +7070,79 @@
           <p:nvPr/>
         </p:nvSpPr>
         <p:spPr>
-          <a:xfrm rot="18955446">
-            <a:off x="6531324" y="1719081"/>
+          <a:xfrm rot="19038493">
+            <a:off x="6541489" y="1714966"/>
+            <a:ext cx="2592721" cy="722648"/>
+          </a:xfrm>
+          <a:prstGeom prst="rect">
+            <a:avLst/>
+          </a:prstGeom>
+          <a:noFill/>
+          <a:ln>
+            <a:noFill/>
+          </a:ln>
+        </p:spPr>
+        <p:style>
+          <a:lnRef idx="0">
+            <a:scrgbClr r="0" g="0" b="0"/>
+          </a:lnRef>
+          <a:fillRef idx="0">
+            <a:scrgbClr r="0" g="0" b="0"/>
+          </a:fillRef>
+          <a:effectRef idx="0">
+            <a:scrgbClr r="0" g="0" b="0"/>
+          </a:effectRef>
+          <a:fontRef idx="minor">
+            <a:schemeClr val="dk1"/>
+          </a:fontRef>
+        </p:style>
+        <p:txBody>
+          <a:bodyPr rtlCol="0" anchor="ctr"/>
+          <a:lstStyle/>
+          <a:p>
+            <a:pPr algn="ctr"/>
+            <a:r>
+              <a:rPr lang="fr-FR" sz="2200" b="1" dirty="0" err="1">
+                <a:solidFill>
+                  <a:srgbClr val="F6591A"/>
+                </a:solidFill>
+                <a:latin typeface="Consolas" panose="020B0609020204030204" pitchFamily="49" charset="0"/>
+              </a:rPr>
+              <a:t>print</a:t>
+            </a:r>
+            <a:r>
+              <a:rPr lang="fr-FR" sz="2200" b="1" dirty="0">
+                <a:solidFill>
+                  <a:srgbClr val="F6591A"/>
+                </a:solidFill>
+                <a:latin typeface="Consolas" panose="020B0609020204030204" pitchFamily="49" charset="0"/>
+              </a:rPr>
+              <a:t>()</a:t>
+            </a:r>
+            <a:endParaRPr lang="en-GB" sz="2200" b="1" dirty="0">
+              <a:solidFill>
+                <a:srgbClr val="F6591A"/>
+              </a:solidFill>
+              <a:latin typeface="Consolas" panose="020B0609020204030204" pitchFamily="49" charset="0"/>
+            </a:endParaRPr>
+          </a:p>
+        </p:txBody>
+      </p:sp>
+      <p:sp>
+        <p:nvSpPr>
+          <p:cNvPr id="18" name="Rectangle 17">
+            <a:extLst>
+              <a:ext uri="{FF2B5EF4-FFF2-40B4-BE49-F238E27FC236}">
+                <a16:creationId xmlns:a16="http://schemas.microsoft.com/office/drawing/2014/main" id="{C6971468-409E-4FBC-A450-971BE4F3F716}"/>
+              </a:ext>
+            </a:extLst>
+          </p:cNvPr>
+          <p:cNvSpPr/>
+          <p:nvPr/>
+        </p:nvSpPr>
+        <p:spPr>
+          <a:xfrm rot="18927848">
+            <a:off x="7352215" y="4175218"/>
             <a:ext cx="2592721" cy="693420"/>
           </a:xfrm>
           <a:prstGeom prst="rect">
@@ -7091,77 +7173,6 @@
           <a:p>
             <a:pPr algn="ctr"/>
             <a:r>
-              <a:rPr lang="fr-FR" sz="2200" b="1" dirty="0" err="1">
-                <a:solidFill>
-                  <a:srgbClr val="F6591A"/>
-                </a:solidFill>
-                <a:latin typeface="Consolas" panose="020B0609020204030204" pitchFamily="49" charset="0"/>
-              </a:rPr>
-              <a:t>print</a:t>
-            </a:r>
-            <a:r>
-              <a:rPr lang="fr-FR" sz="2200" b="1" dirty="0">
-                <a:solidFill>
-                  <a:srgbClr val="F6591A"/>
-                </a:solidFill>
-                <a:latin typeface="Consolas" panose="020B0609020204030204" pitchFamily="49" charset="0"/>
-              </a:rPr>
-              <a:t>()</a:t>
-            </a:r>
-            <a:endParaRPr lang="en-GB" sz="2200" b="1" dirty="0">
-              <a:solidFill>
-                <a:srgbClr val="F6591A"/>
-              </a:solidFill>
-              <a:latin typeface="Consolas" panose="020B0609020204030204" pitchFamily="49" charset="0"/>
-            </a:endParaRPr>
-          </a:p>
-        </p:txBody>
-      </p:sp>
-      <p:sp>
-        <p:nvSpPr>
-          <p:cNvPr id="18" name="Rectangle 17">
-            <a:extLst>
-              <a:ext uri="{FF2B5EF4-FFF2-40B4-BE49-F238E27FC236}">
-                <a16:creationId xmlns:a16="http://schemas.microsoft.com/office/drawing/2014/main" id="{C6971468-409E-4FBC-A450-971BE4F3F716}"/>
-              </a:ext>
-            </a:extLst>
-          </p:cNvPr>
-          <p:cNvSpPr/>
-          <p:nvPr/>
-        </p:nvSpPr>
-        <p:spPr>
-          <a:xfrm rot="19105669">
-            <a:off x="7372239" y="4192155"/>
-            <a:ext cx="2592721" cy="693420"/>
-          </a:xfrm>
-          <a:prstGeom prst="rect">
-            <a:avLst/>
-          </a:prstGeom>
-          <a:noFill/>
-          <a:ln>
-            <a:noFill/>
-          </a:ln>
-        </p:spPr>
-        <p:style>
-          <a:lnRef idx="0">
-            <a:scrgbClr r="0" g="0" b="0"/>
-          </a:lnRef>
-          <a:fillRef idx="0">
-            <a:scrgbClr r="0" g="0" b="0"/>
-          </a:fillRef>
-          <a:effectRef idx="0">
-            <a:scrgbClr r="0" g="0" b="0"/>
-          </a:effectRef>
-          <a:fontRef idx="minor">
-            <a:schemeClr val="dk1"/>
-          </a:fontRef>
-        </p:style>
-        <p:txBody>
-          <a:bodyPr rtlCol="0" anchor="ctr"/>
-          <a:lstStyle/>
-          <a:p>
-            <a:pPr algn="ctr"/>
-            <a:r>
               <a:rPr lang="fr-FR" sz="1600" dirty="0" err="1">
                 <a:solidFill>
                   <a:srgbClr val="F6591A"/>
@@ -7201,7 +7212,7 @@
           <p:nvPr/>
         </p:nvSpPr>
         <p:spPr>
-          <a:xfrm rot="2702592">
+          <a:xfrm rot="2666436">
             <a:off x="5711779" y="4565719"/>
             <a:ext cx="4466681" cy="693420"/>
           </a:xfrm>
@@ -7323,48 +7334,6 @@
           </a:p>
         </p:txBody>
       </p:sp>
-      <p:cxnSp>
-        <p:nvCxnSpPr>
-          <p:cNvPr id="26" name="Straight Arrow Connector 25">
-            <a:extLst>
-              <a:ext uri="{FF2B5EF4-FFF2-40B4-BE49-F238E27FC236}">
-                <a16:creationId xmlns:a16="http://schemas.microsoft.com/office/drawing/2014/main" id="{013A525E-E4A4-4F13-B497-1D0452B8D872}"/>
-              </a:ext>
-            </a:extLst>
-          </p:cNvPr>
-          <p:cNvCxnSpPr>
-            <a:cxnSpLocks/>
-          </p:cNvCxnSpPr>
-          <p:nvPr/>
-        </p:nvCxnSpPr>
-        <p:spPr>
-          <a:xfrm flipV="1">
-            <a:off x="8332869" y="4267558"/>
-            <a:ext cx="908922" cy="756198"/>
-          </a:xfrm>
-          <a:prstGeom prst="straightConnector1">
-            <a:avLst/>
-          </a:prstGeom>
-          <a:ln w="19050">
-            <a:prstDash val="solid"/>
-            <a:tailEnd type="triangle"/>
-          </a:ln>
-        </p:spPr>
-        <p:style>
-          <a:lnRef idx="1">
-            <a:schemeClr val="dk1"/>
-          </a:lnRef>
-          <a:fillRef idx="0">
-            <a:schemeClr val="dk1"/>
-          </a:fillRef>
-          <a:effectRef idx="0">
-            <a:schemeClr val="dk1"/>
-          </a:effectRef>
-          <a:fontRef idx="minor">
-            <a:schemeClr val="tx1"/>
-          </a:fontRef>
-        </p:style>
-      </p:cxnSp>
       <p:sp>
         <p:nvSpPr>
           <p:cNvPr id="36" name="Rectangle 35">
@@ -7378,8 +7347,8 @@
           <p:nvPr/>
         </p:nvSpPr>
         <p:spPr>
-          <a:xfrm rot="2536781">
-            <a:off x="7352216" y="2093517"/>
+          <a:xfrm rot="2643285">
+            <a:off x="7448437" y="2114578"/>
             <a:ext cx="2592721" cy="693420"/>
           </a:xfrm>
           <a:prstGeom prst="rect">
@@ -7675,7 +7644,9 @@
             <a:r>
               <a:rPr lang="fr-FR" sz="2000" b="1" i="1" dirty="0" err="1">
                 <a:solidFill>
-                  <a:srgbClr val="F6591A"/>
+                  <a:schemeClr val="bg1">
+                    <a:lumMod val="50000"/>
+                  </a:schemeClr>
                 </a:solidFill>
               </a:rPr>
               <a:t>Specific</a:t>
@@ -7683,7 +7654,9 @@
             <a:r>
               <a:rPr lang="fr-FR" sz="2000" b="1" i="1" dirty="0">
                 <a:solidFill>
-                  <a:srgbClr val="F6591A"/>
+                  <a:schemeClr val="bg1">
+                    <a:lumMod val="50000"/>
+                  </a:schemeClr>
                 </a:solidFill>
               </a:rPr>
               <a:t> reports:</a:t>
@@ -7808,6 +7781,48 @@
           </a:p>
         </p:txBody>
       </p:sp>
+      <p:cxnSp>
+        <p:nvCxnSpPr>
+          <p:cNvPr id="30" name="Straight Arrow Connector 29">
+            <a:extLst>
+              <a:ext uri="{FF2B5EF4-FFF2-40B4-BE49-F238E27FC236}">
+                <a16:creationId xmlns:a16="http://schemas.microsoft.com/office/drawing/2014/main" id="{60EAF3BA-7B51-473F-A407-D34B6F89405E}"/>
+              </a:ext>
+            </a:extLst>
+          </p:cNvPr>
+          <p:cNvCxnSpPr>
+            <a:cxnSpLocks/>
+          </p:cNvCxnSpPr>
+          <p:nvPr/>
+        </p:nvCxnSpPr>
+        <p:spPr>
+          <a:xfrm flipV="1">
+            <a:off x="8360758" y="4209477"/>
+            <a:ext cx="874589" cy="864165"/>
+          </a:xfrm>
+          <a:prstGeom prst="straightConnector1">
+            <a:avLst/>
+          </a:prstGeom>
+          <a:ln w="19050">
+            <a:prstDash val="solid"/>
+            <a:tailEnd type="triangle"/>
+          </a:ln>
+        </p:spPr>
+        <p:style>
+          <a:lnRef idx="1">
+            <a:schemeClr val="dk1"/>
+          </a:lnRef>
+          <a:fillRef idx="0">
+            <a:schemeClr val="dk1"/>
+          </a:fillRef>
+          <a:effectRef idx="0">
+            <a:schemeClr val="dk1"/>
+          </a:effectRef>
+          <a:fontRef idx="minor">
+            <a:schemeClr val="tx1"/>
+          </a:fontRef>
+        </p:style>
+      </p:cxnSp>
     </p:spTree>
     <p:extLst>
       <p:ext uri="{BB962C8B-B14F-4D97-AF65-F5344CB8AC3E}">

</xml_diff>